<commit_message>
Second iteration complete, some reordering, start on constructor encoding.
</commit_message>
<xml_diff>
--- a/Figures/AnatomyOfADatatype.pptx
+++ b/Figures/AnatomyOfADatatype.pptx
@@ -288,7 +288,7 @@
           <a:p>
             <a:fld id="{18480119-BD8C-794D-B140-4DCFADDE806F}" type="datetimeFigureOut">
               <a:rPr lang="da-DK" smtClean="0"/>
-              <a:t>24/05/14</a:t>
+              <a:t>27/05/14</a:t>
             </a:fld>
             <a:endParaRPr lang="da-DK"/>
           </a:p>
@@ -458,7 +458,7 @@
           <a:p>
             <a:fld id="{18480119-BD8C-794D-B140-4DCFADDE806F}" type="datetimeFigureOut">
               <a:rPr lang="da-DK" smtClean="0"/>
-              <a:t>24/05/14</a:t>
+              <a:t>27/05/14</a:t>
             </a:fld>
             <a:endParaRPr lang="da-DK"/>
           </a:p>
@@ -638,7 +638,7 @@
           <a:p>
             <a:fld id="{18480119-BD8C-794D-B140-4DCFADDE806F}" type="datetimeFigureOut">
               <a:rPr lang="da-DK" smtClean="0"/>
-              <a:t>24/05/14</a:t>
+              <a:t>27/05/14</a:t>
             </a:fld>
             <a:endParaRPr lang="da-DK"/>
           </a:p>
@@ -808,7 +808,7 @@
           <a:p>
             <a:fld id="{18480119-BD8C-794D-B140-4DCFADDE806F}" type="datetimeFigureOut">
               <a:rPr lang="da-DK" smtClean="0"/>
-              <a:t>24/05/14</a:t>
+              <a:t>27/05/14</a:t>
             </a:fld>
             <a:endParaRPr lang="da-DK"/>
           </a:p>
@@ -1054,7 +1054,7 @@
           <a:p>
             <a:fld id="{18480119-BD8C-794D-B140-4DCFADDE806F}" type="datetimeFigureOut">
               <a:rPr lang="da-DK" smtClean="0"/>
-              <a:t>24/05/14</a:t>
+              <a:t>27/05/14</a:t>
             </a:fld>
             <a:endParaRPr lang="da-DK"/>
           </a:p>
@@ -1342,7 +1342,7 @@
           <a:p>
             <a:fld id="{18480119-BD8C-794D-B140-4DCFADDE806F}" type="datetimeFigureOut">
               <a:rPr lang="da-DK" smtClean="0"/>
-              <a:t>24/05/14</a:t>
+              <a:t>27/05/14</a:t>
             </a:fld>
             <a:endParaRPr lang="da-DK"/>
           </a:p>
@@ -1764,7 +1764,7 @@
           <a:p>
             <a:fld id="{18480119-BD8C-794D-B140-4DCFADDE806F}" type="datetimeFigureOut">
               <a:rPr lang="da-DK" smtClean="0"/>
-              <a:t>24/05/14</a:t>
+              <a:t>27/05/14</a:t>
             </a:fld>
             <a:endParaRPr lang="da-DK"/>
           </a:p>
@@ -1882,7 +1882,7 @@
           <a:p>
             <a:fld id="{18480119-BD8C-794D-B140-4DCFADDE806F}" type="datetimeFigureOut">
               <a:rPr lang="da-DK" smtClean="0"/>
-              <a:t>24/05/14</a:t>
+              <a:t>27/05/14</a:t>
             </a:fld>
             <a:endParaRPr lang="da-DK"/>
           </a:p>
@@ -1977,7 +1977,7 @@
           <a:p>
             <a:fld id="{18480119-BD8C-794D-B140-4DCFADDE806F}" type="datetimeFigureOut">
               <a:rPr lang="da-DK" smtClean="0"/>
-              <a:t>24/05/14</a:t>
+              <a:t>27/05/14</a:t>
             </a:fld>
             <a:endParaRPr lang="da-DK"/>
           </a:p>
@@ -2254,7 +2254,7 @@
           <a:p>
             <a:fld id="{18480119-BD8C-794D-B140-4DCFADDE806F}" type="datetimeFigureOut">
               <a:rPr lang="da-DK" smtClean="0"/>
-              <a:t>24/05/14</a:t>
+              <a:t>27/05/14</a:t>
             </a:fld>
             <a:endParaRPr lang="da-DK"/>
           </a:p>
@@ -2507,7 +2507,7 @@
           <a:p>
             <a:fld id="{18480119-BD8C-794D-B140-4DCFADDE806F}" type="datetimeFigureOut">
               <a:rPr lang="da-DK" smtClean="0"/>
-              <a:t>24/05/14</a:t>
+              <a:t>27/05/14</a:t>
             </a:fld>
             <a:endParaRPr lang="da-DK"/>
           </a:p>
@@ -2720,7 +2720,7 @@
           <a:p>
             <a:fld id="{18480119-BD8C-794D-B140-4DCFADDE806F}" type="datetimeFigureOut">
               <a:rPr lang="da-DK" smtClean="0"/>
-              <a:t>24/05/14</a:t>
+              <a:t>27/05/14</a:t>
             </a:fld>
             <a:endParaRPr lang="da-DK"/>
           </a:p>
@@ -3103,7 +3103,7 @@
         </p:nvSpPr>
         <p:spPr>
           <a:xfrm>
-            <a:off x="1136320" y="2916793"/>
+            <a:off x="1517145" y="2916793"/>
             <a:ext cx="7183351" cy="923330"/>
           </a:xfrm>
           <a:prstGeom prst="rect">
@@ -3524,7 +3524,7 @@
         </p:nvSpPr>
         <p:spPr>
           <a:xfrm rot="5400000">
-            <a:off x="1976743" y="2487216"/>
+            <a:off x="2357568" y="2487216"/>
             <a:ext cx="304800" cy="554355"/>
           </a:xfrm>
           <a:prstGeom prst="leftBrace">
@@ -3568,7 +3568,7 @@
         </p:nvSpPr>
         <p:spPr>
           <a:xfrm rot="5400000">
-            <a:off x="3267380" y="2110980"/>
+            <a:off x="3648205" y="2110980"/>
             <a:ext cx="304800" cy="1306829"/>
           </a:xfrm>
           <a:prstGeom prst="leftBrace">
@@ -3612,7 +3612,7 @@
         </p:nvSpPr>
         <p:spPr>
           <a:xfrm rot="5400000">
-            <a:off x="4692953" y="2472930"/>
+            <a:off x="5073778" y="2472930"/>
             <a:ext cx="304802" cy="582929"/>
           </a:xfrm>
           <a:prstGeom prst="leftBrace">
@@ -3656,7 +3656,7 @@
         </p:nvSpPr>
         <p:spPr>
           <a:xfrm>
-            <a:off x="1136320" y="3279382"/>
+            <a:off x="1517145" y="3279382"/>
             <a:ext cx="304800" cy="560741"/>
           </a:xfrm>
           <a:prstGeom prst="leftBrace">
@@ -3700,7 +3700,7 @@
         </p:nvSpPr>
         <p:spPr>
           <a:xfrm rot="16200000">
-            <a:off x="1810690" y="3712154"/>
+            <a:off x="2191515" y="3712154"/>
             <a:ext cx="304800" cy="560741"/>
           </a:xfrm>
           <a:prstGeom prst="leftBrace">
@@ -3744,7 +3744,7 @@
         </p:nvSpPr>
         <p:spPr>
           <a:xfrm rot="16200000">
-            <a:off x="4403889" y="3792206"/>
+            <a:off x="4784714" y="3792206"/>
             <a:ext cx="300000" cy="405429"/>
           </a:xfrm>
           <a:prstGeom prst="leftBrace">
@@ -3788,7 +3788,7 @@
         </p:nvSpPr>
         <p:spPr>
           <a:xfrm rot="16200000">
-            <a:off x="5484481" y="3492458"/>
+            <a:off x="5865306" y="3492458"/>
             <a:ext cx="304802" cy="1000126"/>
           </a:xfrm>
           <a:prstGeom prst="leftBrace">
@@ -3832,7 +3832,7 @@
         </p:nvSpPr>
         <p:spPr>
           <a:xfrm rot="16200000">
-            <a:off x="7167119" y="3895810"/>
+            <a:off x="7547944" y="3895810"/>
             <a:ext cx="285669" cy="174296"/>
           </a:xfrm>
           <a:prstGeom prst="leftBrace">
@@ -3876,7 +3876,7 @@
         </p:nvSpPr>
         <p:spPr>
           <a:xfrm rot="16200000">
-            <a:off x="7670444" y="3727346"/>
+            <a:off x="8051269" y="3727346"/>
             <a:ext cx="290483" cy="516025"/>
           </a:xfrm>
           <a:prstGeom prst="leftBrace">
@@ -3920,7 +3920,7 @@
         </p:nvSpPr>
         <p:spPr>
           <a:xfrm rot="16200000">
-            <a:off x="3123868" y="3375023"/>
+            <a:off x="3504693" y="3375023"/>
             <a:ext cx="304802" cy="1244601"/>
           </a:xfrm>
           <a:prstGeom prst="leftBrace">
@@ -3964,7 +3964,7 @@
         </p:nvSpPr>
         <p:spPr>
           <a:xfrm rot="16200000">
-            <a:off x="4231092" y="3775061"/>
+            <a:off x="4611917" y="3775061"/>
             <a:ext cx="328735" cy="3482978"/>
           </a:xfrm>
           <a:prstGeom prst="leftBrace">
@@ -4008,8 +4008,8 @@
         </p:nvSpPr>
         <p:spPr>
           <a:xfrm rot="19553432">
-            <a:off x="1499803" y="1993551"/>
-            <a:ext cx="1605615" cy="646331"/>
+            <a:off x="2090495" y="1993551"/>
+            <a:ext cx="1185879" cy="646331"/>
           </a:xfrm>
           <a:prstGeom prst="rect">
             <a:avLst/>
@@ -4023,12 +4023,12 @@
           <a:lstStyle/>
           <a:p>
             <a:r>
-              <a:rPr lang="en-GB" dirty="0" err="1" smtClean="0"/>
-              <a:t>datatype</a:t>
-            </a:r>
-            <a:r>
               <a:rPr lang="en-GB" dirty="0" smtClean="0"/>
-              <a:t> name</a:t>
+              <a:t>type </a:t>
+            </a:r>
+            <a:r>
+              <a:rPr lang="en-GB" dirty="0" smtClean="0"/>
+              <a:t>name</a:t>
             </a:r>
           </a:p>
           <a:p>
@@ -4048,7 +4048,7 @@
         </p:nvSpPr>
         <p:spPr>
           <a:xfrm rot="19553432">
-            <a:off x="2702161" y="1989709"/>
+            <a:off x="3082986" y="1989709"/>
             <a:ext cx="1649573" cy="369332"/>
           </a:xfrm>
           <a:prstGeom prst="rect">
@@ -4078,7 +4078,7 @@
         </p:nvSpPr>
         <p:spPr>
           <a:xfrm rot="19553432">
-            <a:off x="4501409" y="2029702"/>
+            <a:off x="4882234" y="2029702"/>
             <a:ext cx="1165140" cy="369332"/>
           </a:xfrm>
           <a:prstGeom prst="rect">
@@ -4108,8 +4108,8 @@
         </p:nvSpPr>
         <p:spPr>
           <a:xfrm rot="19553432">
-            <a:off x="-13812" y="3429579"/>
-            <a:ext cx="1364476" cy="369332"/>
+            <a:off x="-54623" y="3518337"/>
+            <a:ext cx="1838965" cy="369332"/>
           </a:xfrm>
           <a:prstGeom prst="rect">
             <a:avLst/>
@@ -4123,10 +4123,14 @@
           <a:lstStyle/>
           <a:p>
             <a:r>
-              <a:rPr lang="en-GB" smtClean="0"/>
-              <a:t>constructors</a:t>
-            </a:r>
-            <a:endParaRPr lang="en-GB"/>
+              <a:rPr lang="en-GB" dirty="0"/>
+              <a:t>d</a:t>
+            </a:r>
+            <a:r>
+              <a:rPr lang="en-GB" dirty="0" smtClean="0"/>
+              <a:t>ata constructors</a:t>
+            </a:r>
+            <a:endParaRPr lang="en-GB" dirty="0"/>
           </a:p>
         </p:txBody>
       </p:sp>
@@ -4138,7 +4142,7 @@
         </p:nvSpPr>
         <p:spPr>
           <a:xfrm rot="19553432">
-            <a:off x="1622563" y="4248079"/>
+            <a:off x="2003388" y="4248079"/>
             <a:ext cx="481209" cy="369332"/>
           </a:xfrm>
           <a:prstGeom prst="rect">
@@ -4168,7 +4172,7 @@
         </p:nvSpPr>
         <p:spPr>
           <a:xfrm rot="19553432">
-            <a:off x="2116015" y="4494959"/>
+            <a:off x="2496840" y="4494959"/>
             <a:ext cx="1853354" cy="369332"/>
           </a:xfrm>
           <a:prstGeom prst="rect">
@@ -4198,7 +4202,7 @@
         </p:nvSpPr>
         <p:spPr>
           <a:xfrm rot="19553432">
-            <a:off x="3106279" y="4535903"/>
+            <a:off x="3487104" y="4535903"/>
             <a:ext cx="1826141" cy="369332"/>
           </a:xfrm>
           <a:prstGeom prst="rect">
@@ -4228,7 +4232,7 @@
         </p:nvSpPr>
         <p:spPr>
           <a:xfrm rot="19553432">
-            <a:off x="4127569" y="4589839"/>
+            <a:off x="4508394" y="4589839"/>
             <a:ext cx="2018501" cy="369332"/>
           </a:xfrm>
           <a:prstGeom prst="rect">
@@ -4262,7 +4266,7 @@
         </p:nvSpPr>
         <p:spPr>
           <a:xfrm rot="19553432">
-            <a:off x="6376115" y="4424729"/>
+            <a:off x="6756940" y="4424729"/>
             <a:ext cx="1179454" cy="369332"/>
           </a:xfrm>
           <a:prstGeom prst="rect">
@@ -4292,7 +4296,7 @@
         </p:nvSpPr>
         <p:spPr>
           <a:xfrm rot="19553432">
-            <a:off x="7332523" y="4313564"/>
+            <a:off x="7713348" y="4313564"/>
             <a:ext cx="697627" cy="369332"/>
           </a:xfrm>
           <a:prstGeom prst="rect">
@@ -4322,7 +4326,7 @@
         </p:nvSpPr>
         <p:spPr>
           <a:xfrm rot="19553432">
-            <a:off x="4048973" y="5818616"/>
+            <a:off x="4429798" y="5818616"/>
             <a:ext cx="604402" cy="369332"/>
           </a:xfrm>
           <a:prstGeom prst="rect">
@@ -4351,7 +4355,7 @@
         </p:nvSpPr>
         <p:spPr>
           <a:xfrm rot="16200000">
-            <a:off x="7278575" y="4639822"/>
+            <a:off x="7659400" y="4639822"/>
             <a:ext cx="340706" cy="1741490"/>
           </a:xfrm>
           <a:prstGeom prst="leftBrace">
@@ -4395,7 +4399,7 @@
         </p:nvSpPr>
         <p:spPr>
           <a:xfrm rot="19553432">
-            <a:off x="6530937" y="5834957"/>
+            <a:off x="6911762" y="5834957"/>
             <a:ext cx="1191965" cy="369332"/>
           </a:xfrm>
           <a:prstGeom prst="rect">
@@ -4413,7 +4417,84 @@
               <a:rPr lang="en-GB" dirty="0" smtClean="0"/>
               <a:t>result type</a:t>
             </a:r>
-            <a:endParaRPr lang="en-GB" dirty="0" smtClean="0"/>
+          </a:p>
+        </p:txBody>
+      </p:sp>
+      <p:sp>
+        <p:nvSpPr>
+          <p:cNvPr id="30" name="Venstre klammeparentes 29"/>
+          <p:cNvSpPr/>
+          <p:nvPr/>
+        </p:nvSpPr>
+        <p:spPr>
+          <a:xfrm rot="5400000" flipV="1">
+            <a:off x="3935506" y="-312484"/>
+            <a:ext cx="364845" cy="3865565"/>
+          </a:xfrm>
+          <a:prstGeom prst="leftBrace">
+            <a:avLst/>
+          </a:prstGeom>
+          <a:ln/>
+        </p:spPr>
+        <p:style>
+          <a:lnRef idx="3">
+            <a:schemeClr val="dk1"/>
+          </a:lnRef>
+          <a:fillRef idx="0">
+            <a:schemeClr val="dk1"/>
+          </a:fillRef>
+          <a:effectRef idx="2">
+            <a:schemeClr val="dk1"/>
+          </a:effectRef>
+          <a:fontRef idx="minor">
+            <a:schemeClr val="tx1"/>
+          </a:fontRef>
+        </p:style>
+        <p:txBody>
+          <a:bodyPr/>
+          <a:lstStyle/>
+          <a:p>
+            <a:endParaRPr lang="en-GB">
+              <a:ln>
+                <a:solidFill>
+                  <a:srgbClr val="000000"/>
+                </a:solidFill>
+              </a:ln>
+            </a:endParaRPr>
+          </a:p>
+        </p:txBody>
+      </p:sp>
+      <p:sp>
+        <p:nvSpPr>
+          <p:cNvPr id="32" name="Tekstfelt 31"/>
+          <p:cNvSpPr txBox="1"/>
+          <p:nvPr/>
+        </p:nvSpPr>
+        <p:spPr>
+          <a:xfrm rot="19553432">
+            <a:off x="3293832" y="732991"/>
+            <a:ext cx="1741883" cy="369332"/>
+          </a:xfrm>
+          <a:prstGeom prst="rect">
+            <a:avLst/>
+          </a:prstGeom>
+          <a:noFill/>
+        </p:spPr>
+        <p:txBody>
+          <a:bodyPr wrap="none" rtlCol="0">
+            <a:spAutoFit/>
+          </a:bodyPr>
+          <a:lstStyle/>
+          <a:p>
+            <a:r>
+              <a:rPr lang="en-GB" dirty="0" smtClean="0"/>
+              <a:t>type </a:t>
+            </a:r>
+            <a:r>
+              <a:rPr lang="en-GB" dirty="0" smtClean="0"/>
+              <a:t>constructor</a:t>
+            </a:r>
+            <a:endParaRPr lang="en-GB" dirty="0"/>
           </a:p>
         </p:txBody>
       </p:sp>

</xml_diff>